<commit_message>
update the images and Haoran's experiment
</commit_message>
<xml_diff>
--- a/ICRA19/pictures/pdf/ControlledCorrelation.pptx
+++ b/ICRA19/pictures/pdf/ControlledCorrelation.pptx
@@ -302,7 +302,7 @@
           <a:p>
             <a:fld id="{FC441788-6DDF-174F-80D5-0EC3A19C3AB8}" type="datetimeFigureOut">
               <a:rPr lang="en-US" smtClean="0"/>
-              <a:t>9/12/18</a:t>
+              <a:t>9/13/18</a:t>
             </a:fld>
             <a:endParaRPr lang="en-US"/>
           </a:p>
@@ -470,7 +470,7 @@
           <a:p>
             <a:fld id="{FC441788-6DDF-174F-80D5-0EC3A19C3AB8}" type="datetimeFigureOut">
               <a:rPr lang="en-US" smtClean="0"/>
-              <a:t>9/12/18</a:t>
+              <a:t>9/13/18</a:t>
             </a:fld>
             <a:endParaRPr lang="en-US"/>
           </a:p>
@@ -648,7 +648,7 @@
           <a:p>
             <a:fld id="{FC441788-6DDF-174F-80D5-0EC3A19C3AB8}" type="datetimeFigureOut">
               <a:rPr lang="en-US" smtClean="0"/>
-              <a:t>9/12/18</a:t>
+              <a:t>9/13/18</a:t>
             </a:fld>
             <a:endParaRPr lang="en-US"/>
           </a:p>
@@ -816,7 +816,7 @@
           <a:p>
             <a:fld id="{FC441788-6DDF-174F-80D5-0EC3A19C3AB8}" type="datetimeFigureOut">
               <a:rPr lang="en-US" smtClean="0"/>
-              <a:t>9/12/18</a:t>
+              <a:t>9/13/18</a:t>
             </a:fld>
             <a:endParaRPr lang="en-US"/>
           </a:p>
@@ -1061,7 +1061,7 @@
           <a:p>
             <a:fld id="{FC441788-6DDF-174F-80D5-0EC3A19C3AB8}" type="datetimeFigureOut">
               <a:rPr lang="en-US" smtClean="0"/>
-              <a:t>9/12/18</a:t>
+              <a:t>9/13/18</a:t>
             </a:fld>
             <a:endParaRPr lang="en-US"/>
           </a:p>
@@ -1346,7 +1346,7 @@
           <a:p>
             <a:fld id="{FC441788-6DDF-174F-80D5-0EC3A19C3AB8}" type="datetimeFigureOut">
               <a:rPr lang="en-US" smtClean="0"/>
-              <a:t>9/12/18</a:t>
+              <a:t>9/13/18</a:t>
             </a:fld>
             <a:endParaRPr lang="en-US"/>
           </a:p>
@@ -1765,7 +1765,7 @@
           <a:p>
             <a:fld id="{FC441788-6DDF-174F-80D5-0EC3A19C3AB8}" type="datetimeFigureOut">
               <a:rPr lang="en-US" smtClean="0"/>
-              <a:t>9/12/18</a:t>
+              <a:t>9/13/18</a:t>
             </a:fld>
             <a:endParaRPr lang="en-US"/>
           </a:p>
@@ -1882,7 +1882,7 @@
           <a:p>
             <a:fld id="{FC441788-6DDF-174F-80D5-0EC3A19C3AB8}" type="datetimeFigureOut">
               <a:rPr lang="en-US" smtClean="0"/>
-              <a:t>9/12/18</a:t>
+              <a:t>9/13/18</a:t>
             </a:fld>
             <a:endParaRPr lang="en-US"/>
           </a:p>
@@ -1977,7 +1977,7 @@
           <a:p>
             <a:fld id="{FC441788-6DDF-174F-80D5-0EC3A19C3AB8}" type="datetimeFigureOut">
               <a:rPr lang="en-US" smtClean="0"/>
-              <a:t>9/12/18</a:t>
+              <a:t>9/13/18</a:t>
             </a:fld>
             <a:endParaRPr lang="en-US"/>
           </a:p>
@@ -2252,7 +2252,7 @@
           <a:p>
             <a:fld id="{FC441788-6DDF-174F-80D5-0EC3A19C3AB8}" type="datetimeFigureOut">
               <a:rPr lang="en-US" smtClean="0"/>
-              <a:t>9/12/18</a:t>
+              <a:t>9/13/18</a:t>
             </a:fld>
             <a:endParaRPr lang="en-US"/>
           </a:p>
@@ -2504,7 +2504,7 @@
           <a:p>
             <a:fld id="{FC441788-6DDF-174F-80D5-0EC3A19C3AB8}" type="datetimeFigureOut">
               <a:rPr lang="en-US" smtClean="0"/>
-              <a:t>9/12/18</a:t>
+              <a:t>9/13/18</a:t>
             </a:fld>
             <a:endParaRPr lang="en-US"/>
           </a:p>
@@ -2715,7 +2715,7 @@
           <a:p>
             <a:fld id="{FC441788-6DDF-174F-80D5-0EC3A19C3AB8}" type="datetimeFigureOut">
               <a:rPr lang="en-US" smtClean="0"/>
-              <a:t>9/12/18</a:t>
+              <a:t>9/13/18</a:t>
             </a:fld>
             <a:endParaRPr lang="en-US"/>
           </a:p>
@@ -4140,6 +4140,630 @@
           </a:prstGeom>
         </p:spPr>
       </p:pic>
+      <p:cxnSp>
+        <p:nvCxnSpPr>
+          <p:cNvPr id="4" name="Straight Connector 3">
+            <a:extLst>
+              <a:ext uri="{FF2B5EF4-FFF2-40B4-BE49-F238E27FC236}">
+                <a16:creationId xmlns:a16="http://schemas.microsoft.com/office/drawing/2014/main" id="{01B51AD7-BB53-0844-96DE-E172C6256325}"/>
+              </a:ext>
+            </a:extLst>
+          </p:cNvPr>
+          <p:cNvCxnSpPr>
+            <a:cxnSpLocks/>
+          </p:cNvCxnSpPr>
+          <p:nvPr/>
+        </p:nvCxnSpPr>
+        <p:spPr>
+          <a:xfrm flipV="1">
+            <a:off x="1761344" y="2323475"/>
+            <a:ext cx="0" cy="97437"/>
+          </a:xfrm>
+          <a:prstGeom prst="line">
+            <a:avLst/>
+          </a:prstGeom>
+          <a:ln w="12700">
+            <a:solidFill>
+              <a:srgbClr val="008F00"/>
+            </a:solidFill>
+            <a:headEnd w="sm" len="med"/>
+            <a:tailEnd type="stealth" w="sm" len="med"/>
+          </a:ln>
+          <a:effectLst/>
+        </p:spPr>
+        <p:style>
+          <a:lnRef idx="2">
+            <a:schemeClr val="accent1"/>
+          </a:lnRef>
+          <a:fillRef idx="0">
+            <a:schemeClr val="accent1"/>
+          </a:fillRef>
+          <a:effectRef idx="1">
+            <a:schemeClr val="accent1"/>
+          </a:effectRef>
+          <a:fontRef idx="minor">
+            <a:schemeClr val="tx1"/>
+          </a:fontRef>
+        </p:style>
+      </p:cxnSp>
+      <p:sp>
+        <p:nvSpPr>
+          <p:cNvPr id="34" name="TextBox 33">
+            <a:extLst>
+              <a:ext uri="{FF2B5EF4-FFF2-40B4-BE49-F238E27FC236}">
+                <a16:creationId xmlns:a16="http://schemas.microsoft.com/office/drawing/2014/main" id="{CB544E73-76A6-154A-9BAA-BC0B124ED2F9}"/>
+              </a:ext>
+            </a:extLst>
+          </p:cNvPr>
+          <p:cNvSpPr txBox="1"/>
+          <p:nvPr/>
+        </p:nvSpPr>
+        <p:spPr>
+          <a:xfrm>
+            <a:off x="1906549" y="1627758"/>
+            <a:ext cx="612513" cy="369332"/>
+          </a:xfrm>
+          <a:prstGeom prst="rect">
+            <a:avLst/>
+          </a:prstGeom>
+          <a:noFill/>
+        </p:spPr>
+        <p:txBody>
+          <a:bodyPr wrap="square" rtlCol="0">
+            <a:spAutoFit/>
+          </a:bodyPr>
+          <a:lstStyle/>
+          <a:p>
+            <a:r>
+              <a:rPr lang="en-US" i="1" dirty="0" err="1">
+                <a:solidFill>
+                  <a:srgbClr val="008F00"/>
+                </a:solidFill>
+                <a:latin typeface="Times New Roman"/>
+                <a:cs typeface="Times New Roman"/>
+              </a:rPr>
+              <a:t>r</a:t>
+            </a:r>
+            <a:r>
+              <a:rPr lang="en-US" baseline="-25000" dirty="0" err="1">
+                <a:solidFill>
+                  <a:srgbClr val="008F00"/>
+                </a:solidFill>
+                <a:latin typeface="Times New Roman"/>
+                <a:cs typeface="Times New Roman"/>
+              </a:rPr>
+              <a:t>top</a:t>
+            </a:r>
+            <a:endParaRPr lang="en-US" dirty="0">
+              <a:solidFill>
+                <a:srgbClr val="008F00"/>
+              </a:solidFill>
+              <a:latin typeface="Times New Roman"/>
+              <a:cs typeface="Times New Roman"/>
+            </a:endParaRPr>
+          </a:p>
+        </p:txBody>
+      </p:sp>
+      <p:sp>
+        <p:nvSpPr>
+          <p:cNvPr id="37" name="TextBox 36">
+            <a:extLst>
+              <a:ext uri="{FF2B5EF4-FFF2-40B4-BE49-F238E27FC236}">
+                <a16:creationId xmlns:a16="http://schemas.microsoft.com/office/drawing/2014/main" id="{AC83D7DF-F1AB-2C4A-BEE2-FE520B8684DB}"/>
+              </a:ext>
+            </a:extLst>
+          </p:cNvPr>
+          <p:cNvSpPr txBox="1"/>
+          <p:nvPr/>
+        </p:nvSpPr>
+        <p:spPr>
+          <a:xfrm>
+            <a:off x="1824075" y="2177078"/>
+            <a:ext cx="895026" cy="369332"/>
+          </a:xfrm>
+          <a:prstGeom prst="rect">
+            <a:avLst/>
+          </a:prstGeom>
+          <a:noFill/>
+        </p:spPr>
+        <p:txBody>
+          <a:bodyPr wrap="square" rtlCol="0">
+            <a:spAutoFit/>
+          </a:bodyPr>
+          <a:lstStyle/>
+          <a:p>
+            <a:r>
+              <a:rPr lang="en-US" i="1" dirty="0" err="1">
+                <a:solidFill>
+                  <a:srgbClr val="008F00"/>
+                </a:solidFill>
+                <a:latin typeface="Times New Roman"/>
+                <a:cs typeface="Times New Roman"/>
+              </a:rPr>
+              <a:t>r</a:t>
+            </a:r>
+            <a:r>
+              <a:rPr lang="en-US" baseline="-25000" dirty="0" err="1">
+                <a:solidFill>
+                  <a:srgbClr val="008F00"/>
+                </a:solidFill>
+                <a:latin typeface="Times New Roman"/>
+                <a:cs typeface="Times New Roman"/>
+              </a:rPr>
+              <a:t>bottom</a:t>
+            </a:r>
+            <a:endParaRPr lang="en-US" dirty="0">
+              <a:solidFill>
+                <a:srgbClr val="008F00"/>
+              </a:solidFill>
+              <a:latin typeface="Times New Roman"/>
+              <a:cs typeface="Times New Roman"/>
+            </a:endParaRPr>
+          </a:p>
+        </p:txBody>
+      </p:sp>
+      <p:cxnSp>
+        <p:nvCxnSpPr>
+          <p:cNvPr id="38" name="Straight Connector 37">
+            <a:extLst>
+              <a:ext uri="{FF2B5EF4-FFF2-40B4-BE49-F238E27FC236}">
+                <a16:creationId xmlns:a16="http://schemas.microsoft.com/office/drawing/2014/main" id="{1FCC095A-4F5D-B841-93E6-82CF9F731A73}"/>
+              </a:ext>
+            </a:extLst>
+          </p:cNvPr>
+          <p:cNvCxnSpPr>
+            <a:cxnSpLocks/>
+          </p:cNvCxnSpPr>
+          <p:nvPr/>
+        </p:nvCxnSpPr>
+        <p:spPr>
+          <a:xfrm flipV="1">
+            <a:off x="1824075" y="1962300"/>
+            <a:ext cx="0" cy="458612"/>
+          </a:xfrm>
+          <a:prstGeom prst="line">
+            <a:avLst/>
+          </a:prstGeom>
+          <a:ln w="12700">
+            <a:solidFill>
+              <a:srgbClr val="008F00"/>
+            </a:solidFill>
+            <a:headEnd w="sm" len="med"/>
+            <a:tailEnd type="stealth" w="sm" len="med"/>
+          </a:ln>
+          <a:effectLst/>
+        </p:spPr>
+        <p:style>
+          <a:lnRef idx="2">
+            <a:schemeClr val="accent1"/>
+          </a:lnRef>
+          <a:fillRef idx="0">
+            <a:schemeClr val="accent1"/>
+          </a:fillRef>
+          <a:effectRef idx="1">
+            <a:schemeClr val="accent1"/>
+          </a:effectRef>
+          <a:fontRef idx="minor">
+            <a:schemeClr val="tx1"/>
+          </a:fontRef>
+        </p:style>
+      </p:cxnSp>
+      <p:cxnSp>
+        <p:nvCxnSpPr>
+          <p:cNvPr id="41" name="Straight Connector 40">
+            <a:extLst>
+              <a:ext uri="{FF2B5EF4-FFF2-40B4-BE49-F238E27FC236}">
+                <a16:creationId xmlns:a16="http://schemas.microsoft.com/office/drawing/2014/main" id="{63509634-71C5-7346-A455-0862842F33E8}"/>
+              </a:ext>
+            </a:extLst>
+          </p:cNvPr>
+          <p:cNvCxnSpPr>
+            <a:cxnSpLocks/>
+          </p:cNvCxnSpPr>
+          <p:nvPr/>
+        </p:nvCxnSpPr>
+        <p:spPr>
+          <a:xfrm>
+            <a:off x="151423" y="2201956"/>
+            <a:ext cx="1054564" cy="0"/>
+          </a:xfrm>
+          <a:prstGeom prst="line">
+            <a:avLst/>
+          </a:prstGeom>
+          <a:ln w="12700">
+            <a:solidFill>
+              <a:srgbClr val="008F00"/>
+            </a:solidFill>
+            <a:headEnd w="sm" len="med"/>
+            <a:tailEnd type="stealth" w="sm" len="med"/>
+          </a:ln>
+          <a:effectLst/>
+        </p:spPr>
+        <p:style>
+          <a:lnRef idx="2">
+            <a:schemeClr val="accent1"/>
+          </a:lnRef>
+          <a:fillRef idx="0">
+            <a:schemeClr val="accent1"/>
+          </a:fillRef>
+          <a:effectRef idx="1">
+            <a:schemeClr val="accent1"/>
+          </a:effectRef>
+          <a:fontRef idx="minor">
+            <a:schemeClr val="tx1"/>
+          </a:fontRef>
+        </p:style>
+      </p:cxnSp>
+      <p:sp>
+        <p:nvSpPr>
+          <p:cNvPr id="43" name="TextBox 42">
+            <a:extLst>
+              <a:ext uri="{FF2B5EF4-FFF2-40B4-BE49-F238E27FC236}">
+                <a16:creationId xmlns:a16="http://schemas.microsoft.com/office/drawing/2014/main" id="{B62A7C0D-F17A-0B46-8445-9E4A43B933A6}"/>
+              </a:ext>
+            </a:extLst>
+          </p:cNvPr>
+          <p:cNvSpPr txBox="1"/>
+          <p:nvPr/>
+        </p:nvSpPr>
+        <p:spPr>
+          <a:xfrm>
+            <a:off x="763452" y="1670021"/>
+            <a:ext cx="612513" cy="369332"/>
+          </a:xfrm>
+          <a:prstGeom prst="rect">
+            <a:avLst/>
+          </a:prstGeom>
+          <a:noFill/>
+        </p:spPr>
+        <p:txBody>
+          <a:bodyPr wrap="square" rtlCol="0">
+            <a:spAutoFit/>
+          </a:bodyPr>
+          <a:lstStyle/>
+          <a:p>
+            <a:r>
+              <a:rPr lang="en-US" i="1" dirty="0" err="1">
+                <a:solidFill>
+                  <a:srgbClr val="008F00"/>
+                </a:solidFill>
+                <a:latin typeface="Times New Roman"/>
+                <a:cs typeface="Times New Roman"/>
+              </a:rPr>
+              <a:t>r</a:t>
+            </a:r>
+            <a:r>
+              <a:rPr lang="en-US" baseline="-25000" dirty="0" err="1">
+                <a:solidFill>
+                  <a:srgbClr val="008F00"/>
+                </a:solidFill>
+                <a:latin typeface="Times New Roman"/>
+                <a:cs typeface="Times New Roman"/>
+              </a:rPr>
+              <a:t>left</a:t>
+            </a:r>
+            <a:endParaRPr lang="en-US" dirty="0">
+              <a:solidFill>
+                <a:srgbClr val="008F00"/>
+              </a:solidFill>
+              <a:latin typeface="Times New Roman"/>
+              <a:cs typeface="Times New Roman"/>
+            </a:endParaRPr>
+          </a:p>
+        </p:txBody>
+      </p:sp>
+      <p:cxnSp>
+        <p:nvCxnSpPr>
+          <p:cNvPr id="44" name="Straight Connector 43">
+            <a:extLst>
+              <a:ext uri="{FF2B5EF4-FFF2-40B4-BE49-F238E27FC236}">
+                <a16:creationId xmlns:a16="http://schemas.microsoft.com/office/drawing/2014/main" id="{0C9DE58E-8364-0D4C-95F3-0CFC88613B1D}"/>
+              </a:ext>
+            </a:extLst>
+          </p:cNvPr>
+          <p:cNvCxnSpPr>
+            <a:cxnSpLocks/>
+          </p:cNvCxnSpPr>
+          <p:nvPr/>
+        </p:nvCxnSpPr>
+        <p:spPr>
+          <a:xfrm>
+            <a:off x="7206914" y="1695183"/>
+            <a:ext cx="749116" cy="0"/>
+          </a:xfrm>
+          <a:prstGeom prst="line">
+            <a:avLst/>
+          </a:prstGeom>
+          <a:ln w="12700">
+            <a:solidFill>
+              <a:srgbClr val="008F00"/>
+            </a:solidFill>
+            <a:headEnd w="sm" len="med"/>
+            <a:tailEnd type="stealth" w="sm" len="med"/>
+          </a:ln>
+          <a:effectLst/>
+        </p:spPr>
+        <p:style>
+          <a:lnRef idx="2">
+            <a:schemeClr val="accent1"/>
+          </a:lnRef>
+          <a:fillRef idx="0">
+            <a:schemeClr val="accent1"/>
+          </a:fillRef>
+          <a:effectRef idx="1">
+            <a:schemeClr val="accent1"/>
+          </a:effectRef>
+          <a:fontRef idx="minor">
+            <a:schemeClr val="tx1"/>
+          </a:fontRef>
+        </p:style>
+      </p:cxnSp>
+      <p:cxnSp>
+        <p:nvCxnSpPr>
+          <p:cNvPr id="46" name="Straight Connector 45">
+            <a:extLst>
+              <a:ext uri="{FF2B5EF4-FFF2-40B4-BE49-F238E27FC236}">
+                <a16:creationId xmlns:a16="http://schemas.microsoft.com/office/drawing/2014/main" id="{4BD0ABBF-301C-ED4B-A1B3-814B30FA09E4}"/>
+              </a:ext>
+            </a:extLst>
+          </p:cNvPr>
+          <p:cNvCxnSpPr>
+            <a:cxnSpLocks/>
+          </p:cNvCxnSpPr>
+          <p:nvPr/>
+        </p:nvCxnSpPr>
+        <p:spPr>
+          <a:xfrm flipV="1">
+            <a:off x="8053470" y="1812424"/>
+            <a:ext cx="0" cy="608488"/>
+          </a:xfrm>
+          <a:prstGeom prst="line">
+            <a:avLst/>
+          </a:prstGeom>
+          <a:ln w="12700">
+            <a:solidFill>
+              <a:srgbClr val="008F00"/>
+            </a:solidFill>
+            <a:headEnd w="sm" len="med"/>
+            <a:tailEnd type="stealth" w="sm" len="med"/>
+          </a:ln>
+          <a:effectLst/>
+        </p:spPr>
+        <p:style>
+          <a:lnRef idx="2">
+            <a:schemeClr val="accent1"/>
+          </a:lnRef>
+          <a:fillRef idx="0">
+            <a:schemeClr val="accent1"/>
+          </a:fillRef>
+          <a:effectRef idx="1">
+            <a:schemeClr val="accent1"/>
+          </a:effectRef>
+          <a:fontRef idx="minor">
+            <a:schemeClr val="tx1"/>
+          </a:fontRef>
+        </p:style>
+      </p:cxnSp>
+      <p:cxnSp>
+        <p:nvCxnSpPr>
+          <p:cNvPr id="48" name="Straight Connector 47">
+            <a:extLst>
+              <a:ext uri="{FF2B5EF4-FFF2-40B4-BE49-F238E27FC236}">
+                <a16:creationId xmlns:a16="http://schemas.microsoft.com/office/drawing/2014/main" id="{08CB7C9E-2553-5E46-9F3C-294AFC1498E9}"/>
+              </a:ext>
+            </a:extLst>
+          </p:cNvPr>
+          <p:cNvCxnSpPr>
+            <a:cxnSpLocks/>
+          </p:cNvCxnSpPr>
+          <p:nvPr/>
+        </p:nvCxnSpPr>
+        <p:spPr>
+          <a:xfrm flipV="1">
+            <a:off x="8629342" y="1319134"/>
+            <a:ext cx="0" cy="1101778"/>
+          </a:xfrm>
+          <a:prstGeom prst="line">
+            <a:avLst/>
+          </a:prstGeom>
+          <a:ln w="12700">
+            <a:solidFill>
+              <a:srgbClr val="008F00"/>
+            </a:solidFill>
+            <a:headEnd w="sm" len="med"/>
+            <a:tailEnd type="stealth" w="sm" len="med"/>
+          </a:ln>
+          <a:effectLst/>
+        </p:spPr>
+        <p:style>
+          <a:lnRef idx="2">
+            <a:schemeClr val="accent1"/>
+          </a:lnRef>
+          <a:fillRef idx="0">
+            <a:schemeClr val="accent1"/>
+          </a:fillRef>
+          <a:effectRef idx="1">
+            <a:schemeClr val="accent1"/>
+          </a:effectRef>
+          <a:fontRef idx="minor">
+            <a:schemeClr val="tx1"/>
+          </a:fontRef>
+        </p:style>
+      </p:cxnSp>
+      <p:sp>
+        <p:nvSpPr>
+          <p:cNvPr id="50" name="TextBox 49">
+            <a:extLst>
+              <a:ext uri="{FF2B5EF4-FFF2-40B4-BE49-F238E27FC236}">
+                <a16:creationId xmlns:a16="http://schemas.microsoft.com/office/drawing/2014/main" id="{B58F682A-8DF7-3A49-9169-C09D79F635DF}"/>
+              </a:ext>
+            </a:extLst>
+          </p:cNvPr>
+          <p:cNvSpPr txBox="1"/>
+          <p:nvPr/>
+        </p:nvSpPr>
+        <p:spPr>
+          <a:xfrm>
+            <a:off x="8242131" y="1438475"/>
+            <a:ext cx="612513" cy="369332"/>
+          </a:xfrm>
+          <a:prstGeom prst="rect">
+            <a:avLst/>
+          </a:prstGeom>
+          <a:noFill/>
+        </p:spPr>
+        <p:txBody>
+          <a:bodyPr wrap="square" rtlCol="0">
+            <a:spAutoFit/>
+          </a:bodyPr>
+          <a:lstStyle/>
+          <a:p>
+            <a:r>
+              <a:rPr lang="en-US" i="1" dirty="0" err="1">
+                <a:solidFill>
+                  <a:srgbClr val="008F00"/>
+                </a:solidFill>
+                <a:latin typeface="Times New Roman"/>
+                <a:cs typeface="Times New Roman"/>
+              </a:rPr>
+              <a:t>r</a:t>
+            </a:r>
+            <a:r>
+              <a:rPr lang="en-US" baseline="-25000" dirty="0" err="1">
+                <a:solidFill>
+                  <a:srgbClr val="008F00"/>
+                </a:solidFill>
+                <a:latin typeface="Times New Roman"/>
+                <a:cs typeface="Times New Roman"/>
+              </a:rPr>
+              <a:t>top</a:t>
+            </a:r>
+            <a:endParaRPr lang="en-US" dirty="0">
+              <a:solidFill>
+                <a:srgbClr val="008F00"/>
+              </a:solidFill>
+              <a:latin typeface="Times New Roman"/>
+              <a:cs typeface="Times New Roman"/>
+            </a:endParaRPr>
+          </a:p>
+        </p:txBody>
+      </p:sp>
+      <p:sp>
+        <p:nvSpPr>
+          <p:cNvPr id="51" name="TextBox 50">
+            <a:extLst>
+              <a:ext uri="{FF2B5EF4-FFF2-40B4-BE49-F238E27FC236}">
+                <a16:creationId xmlns:a16="http://schemas.microsoft.com/office/drawing/2014/main" id="{26066B34-D94E-7B46-B440-91B5F0111C8E}"/>
+              </a:ext>
+            </a:extLst>
+          </p:cNvPr>
+          <p:cNvSpPr txBox="1"/>
+          <p:nvPr/>
+        </p:nvSpPr>
+        <p:spPr>
+          <a:xfrm>
+            <a:off x="7429531" y="2006940"/>
+            <a:ext cx="895026" cy="369332"/>
+          </a:xfrm>
+          <a:prstGeom prst="rect">
+            <a:avLst/>
+          </a:prstGeom>
+          <a:noFill/>
+        </p:spPr>
+        <p:txBody>
+          <a:bodyPr wrap="square" rtlCol="0">
+            <a:spAutoFit/>
+          </a:bodyPr>
+          <a:lstStyle/>
+          <a:p>
+            <a:r>
+              <a:rPr lang="en-US" i="1" dirty="0" err="1">
+                <a:solidFill>
+                  <a:srgbClr val="008F00"/>
+                </a:solidFill>
+                <a:latin typeface="Times New Roman"/>
+                <a:cs typeface="Times New Roman"/>
+              </a:rPr>
+              <a:t>r</a:t>
+            </a:r>
+            <a:r>
+              <a:rPr lang="en-US" baseline="-25000" dirty="0" err="1">
+                <a:solidFill>
+                  <a:srgbClr val="008F00"/>
+                </a:solidFill>
+                <a:latin typeface="Times New Roman"/>
+                <a:cs typeface="Times New Roman"/>
+              </a:rPr>
+              <a:t>bottom</a:t>
+            </a:r>
+            <a:endParaRPr lang="en-US" dirty="0">
+              <a:solidFill>
+                <a:srgbClr val="008F00"/>
+              </a:solidFill>
+              <a:latin typeface="Times New Roman"/>
+              <a:cs typeface="Times New Roman"/>
+            </a:endParaRPr>
+          </a:p>
+        </p:txBody>
+      </p:sp>
+      <p:sp>
+        <p:nvSpPr>
+          <p:cNvPr id="52" name="TextBox 51">
+            <a:extLst>
+              <a:ext uri="{FF2B5EF4-FFF2-40B4-BE49-F238E27FC236}">
+                <a16:creationId xmlns:a16="http://schemas.microsoft.com/office/drawing/2014/main" id="{4BEFF22E-7215-C24B-ADBC-3CD99381D6FD}"/>
+              </a:ext>
+            </a:extLst>
+          </p:cNvPr>
+          <p:cNvSpPr txBox="1"/>
+          <p:nvPr/>
+        </p:nvSpPr>
+        <p:spPr>
+          <a:xfrm>
+            <a:off x="7145250" y="1580301"/>
+            <a:ext cx="612513" cy="369332"/>
+          </a:xfrm>
+          <a:prstGeom prst="rect">
+            <a:avLst/>
+          </a:prstGeom>
+          <a:noFill/>
+        </p:spPr>
+        <p:txBody>
+          <a:bodyPr wrap="square" rtlCol="0">
+            <a:spAutoFit/>
+          </a:bodyPr>
+          <a:lstStyle/>
+          <a:p>
+            <a:r>
+              <a:rPr lang="en-US" i="1" dirty="0" err="1">
+                <a:solidFill>
+                  <a:srgbClr val="008F00"/>
+                </a:solidFill>
+                <a:latin typeface="Times New Roman"/>
+                <a:cs typeface="Times New Roman"/>
+              </a:rPr>
+              <a:t>r</a:t>
+            </a:r>
+            <a:r>
+              <a:rPr lang="en-US" baseline="-25000" dirty="0" err="1">
+                <a:solidFill>
+                  <a:srgbClr val="008F00"/>
+                </a:solidFill>
+                <a:latin typeface="Times New Roman"/>
+                <a:cs typeface="Times New Roman"/>
+              </a:rPr>
+              <a:t>left</a:t>
+            </a:r>
+            <a:endParaRPr lang="en-US" dirty="0">
+              <a:solidFill>
+                <a:srgbClr val="008F00"/>
+              </a:solidFill>
+              <a:latin typeface="Times New Roman"/>
+              <a:cs typeface="Times New Roman"/>
+            </a:endParaRPr>
+          </a:p>
+        </p:txBody>
+      </p:sp>
     </p:spTree>
     <p:extLst>
       <p:ext uri="{BB962C8B-B14F-4D97-AF65-F5344CB8AC3E}">

</xml_diff>